<commit_message>
Changed typo in sciencecloud presentation. Added python basic live notes.
</commit_message>
<xml_diff>
--- a/01-terminal/ScienceCloud.pptx
+++ b/01-terminal/ScienceCloud.pptx
@@ -114,6 +114,11 @@
       </a:defRPr>
     </a:lvl9pPr>
   </p:defaultTextStyle>
+  <p:extLst>
+    <p:ext uri="{EFAFB233-063F-42B5-8137-9DF3F51BA10A}">
+      <p15:sldGuideLst xmlns:p15="http://schemas.microsoft.com/office/powerpoint/2012/main"/>
+    </p:ext>
+  </p:extLst>
 </p:presentation>
 </file>
 
@@ -266,7 +271,7 @@
           <a:p>
             <a:fld id="{331A492B-FC9F-294F-A4AD-26E45947B24F}" type="datetimeFigureOut">
               <a:rPr lang="en-CH" smtClean="0"/>
-              <a:t>23.08.23</a:t>
+              <a:t>21.08.2024</a:t>
             </a:fld>
             <a:endParaRPr lang="en-CH"/>
           </a:p>
@@ -466,7 +471,7 @@
           <a:p>
             <a:fld id="{331A492B-FC9F-294F-A4AD-26E45947B24F}" type="datetimeFigureOut">
               <a:rPr lang="en-CH" smtClean="0"/>
-              <a:t>23.08.23</a:t>
+              <a:t>21.08.2024</a:t>
             </a:fld>
             <a:endParaRPr lang="en-CH"/>
           </a:p>
@@ -676,7 +681,7 @@
           <a:p>
             <a:fld id="{331A492B-FC9F-294F-A4AD-26E45947B24F}" type="datetimeFigureOut">
               <a:rPr lang="en-CH" smtClean="0"/>
-              <a:t>23.08.23</a:t>
+              <a:t>21.08.2024</a:t>
             </a:fld>
             <a:endParaRPr lang="en-CH"/>
           </a:p>
@@ -876,7 +881,7 @@
           <a:p>
             <a:fld id="{331A492B-FC9F-294F-A4AD-26E45947B24F}" type="datetimeFigureOut">
               <a:rPr lang="en-CH" smtClean="0"/>
-              <a:t>23.08.23</a:t>
+              <a:t>21.08.2024</a:t>
             </a:fld>
             <a:endParaRPr lang="en-CH"/>
           </a:p>
@@ -1152,7 +1157,7 @@
           <a:p>
             <a:fld id="{331A492B-FC9F-294F-A4AD-26E45947B24F}" type="datetimeFigureOut">
               <a:rPr lang="en-CH" smtClean="0"/>
-              <a:t>23.08.23</a:t>
+              <a:t>21.08.2024</a:t>
             </a:fld>
             <a:endParaRPr lang="en-CH"/>
           </a:p>
@@ -1420,7 +1425,7 @@
           <a:p>
             <a:fld id="{331A492B-FC9F-294F-A4AD-26E45947B24F}" type="datetimeFigureOut">
               <a:rPr lang="en-CH" smtClean="0"/>
-              <a:t>23.08.23</a:t>
+              <a:t>21.08.2024</a:t>
             </a:fld>
             <a:endParaRPr lang="en-CH"/>
           </a:p>
@@ -1835,7 +1840,7 @@
           <a:p>
             <a:fld id="{331A492B-FC9F-294F-A4AD-26E45947B24F}" type="datetimeFigureOut">
               <a:rPr lang="en-CH" smtClean="0"/>
-              <a:t>23.08.23</a:t>
+              <a:t>21.08.2024</a:t>
             </a:fld>
             <a:endParaRPr lang="en-CH"/>
           </a:p>
@@ -1977,7 +1982,7 @@
           <a:p>
             <a:fld id="{331A492B-FC9F-294F-A4AD-26E45947B24F}" type="datetimeFigureOut">
               <a:rPr lang="en-CH" smtClean="0"/>
-              <a:t>23.08.23</a:t>
+              <a:t>21.08.2024</a:t>
             </a:fld>
             <a:endParaRPr lang="en-CH"/>
           </a:p>
@@ -2090,7 +2095,7 @@
           <a:p>
             <a:fld id="{331A492B-FC9F-294F-A4AD-26E45947B24F}" type="datetimeFigureOut">
               <a:rPr lang="en-CH" smtClean="0"/>
-              <a:t>23.08.23</a:t>
+              <a:t>21.08.2024</a:t>
             </a:fld>
             <a:endParaRPr lang="en-CH"/>
           </a:p>
@@ -2403,7 +2408,7 @@
           <a:p>
             <a:fld id="{331A492B-FC9F-294F-A4AD-26E45947B24F}" type="datetimeFigureOut">
               <a:rPr lang="en-CH" smtClean="0"/>
-              <a:t>23.08.23</a:t>
+              <a:t>21.08.2024</a:t>
             </a:fld>
             <a:endParaRPr lang="en-CH"/>
           </a:p>
@@ -2692,7 +2697,7 @@
           <a:p>
             <a:fld id="{331A492B-FC9F-294F-A4AD-26E45947B24F}" type="datetimeFigureOut">
               <a:rPr lang="en-CH" smtClean="0"/>
-              <a:t>23.08.23</a:t>
+              <a:t>21.08.2024</a:t>
             </a:fld>
             <a:endParaRPr lang="en-CH"/>
           </a:p>
@@ -2935,7 +2940,7 @@
           <a:p>
             <a:fld id="{331A492B-FC9F-294F-A4AD-26E45947B24F}" type="datetimeFigureOut">
               <a:rPr lang="en-CH" smtClean="0"/>
-              <a:t>23.08.23</a:t>
+              <a:t>21.08.2024</a:t>
             </a:fld>
             <a:endParaRPr lang="en-CH"/>
           </a:p>
@@ -4407,21 +4412,7 @@
                 <a:latin typeface="Courier New" panose="02070309020205020404" pitchFamily="49" charset="0"/>
                 <a:cs typeface="Courier New" panose="02070309020205020404" pitchFamily="49" charset="0"/>
               </a:rPr>
-              <a:t>cat ~/.</a:t>
-            </a:r>
-            <a:r>
-              <a:rPr lang="en-GB" sz="2400" i="1" dirty="0" err="1">
-                <a:latin typeface="Courier New" panose="02070309020205020404" pitchFamily="49" charset="0"/>
-                <a:cs typeface="Courier New" panose="02070309020205020404" pitchFamily="49" charset="0"/>
-              </a:rPr>
-              <a:t>ssh</a:t>
-            </a:r>
-            <a:r>
-              <a:rPr lang="en-GB" sz="2400" i="1" dirty="0">
-                <a:latin typeface="Courier New" panose="02070309020205020404" pitchFamily="49" charset="0"/>
-                <a:cs typeface="Courier New" panose="02070309020205020404" pitchFamily="49" charset="0"/>
-              </a:rPr>
-              <a:t>/</a:t>
+              <a:t>cat ~/.ssh/</a:t>
             </a:r>
             <a:r>
               <a:rPr lang="en-GB" sz="2400" i="1" dirty="0" err="1">
@@ -4462,36 +4453,19 @@
                 <a:latin typeface="Courier New" panose="02070309020205020404" pitchFamily="49" charset="0"/>
                 <a:cs typeface="Courier New" panose="02070309020205020404" pitchFamily="49" charset="0"/>
               </a:rPr>
-              <a:t>/.</a:t>
+              <a:t>/.ssh/</a:t>
             </a:r>
             <a:r>
               <a:rPr lang="en-GB" sz="2400" i="1" dirty="0" err="1">
                 <a:latin typeface="Courier New" panose="02070309020205020404" pitchFamily="49" charset="0"/>
                 <a:cs typeface="Courier New" panose="02070309020205020404" pitchFamily="49" charset="0"/>
               </a:rPr>
-              <a:t>ssh</a:t>
-            </a:r>
-            <a:r>
-              <a:rPr lang="en-GB" sz="2400" i="1" dirty="0">
-                <a:latin typeface="Courier New" panose="02070309020205020404" pitchFamily="49" charset="0"/>
-                <a:cs typeface="Courier New" panose="02070309020205020404" pitchFamily="49" charset="0"/>
-              </a:rPr>
-              <a:t>/</a:t>
-            </a:r>
-            <a:r>
-              <a:rPr lang="en-GB" sz="2400" i="1" dirty="0" err="1">
-                <a:latin typeface="Courier New" panose="02070309020205020404" pitchFamily="49" charset="0"/>
-                <a:cs typeface="Courier New" panose="02070309020205020404" pitchFamily="49" charset="0"/>
-              </a:rPr>
-              <a:t>id_rsa</a:t>
-            </a:r>
-            <a:r>
-              <a:rPr lang="en-GB" sz="2400" i="1" dirty="0">
-                <a:latin typeface="Courier New" panose="02070309020205020404" pitchFamily="49" charset="0"/>
-                <a:cs typeface="Courier New" panose="02070309020205020404" pitchFamily="49" charset="0"/>
-              </a:rPr>
-              <a:t>/pub</a:t>
-            </a:r>
+              <a:t>id_rsa.pub</a:t>
+            </a:r>
+            <a:endParaRPr lang="en-GB" sz="2400" i="1" dirty="0">
+              <a:latin typeface="Courier New" panose="02070309020205020404" pitchFamily="49" charset="0"/>
+              <a:cs typeface="Courier New" panose="02070309020205020404" pitchFamily="49" charset="0"/>
+            </a:endParaRPr>
           </a:p>
           <a:p>
             <a:pPr marL="571500" indent="-571500">

</xml_diff>